<commit_message>
Printed version for Younicorn
</commit_message>
<xml_diff>
--- a/Presentations/KNITS/KNITS-Logo.pptx
+++ b/Presentations/KNITS/KNITS-Logo.pptx
@@ -145,7 +145,7 @@
   </p:defaultTextStyle>
   <p:extLst>
     <p:ext uri="{EFAFB233-063F-42B5-8137-9DF3F51BA10A}">
-      <p15:sldGuideLst xmlns:p15="http://schemas.microsoft.com/office/powerpoint/2012/main">
+      <p15:sldGuideLst xmlns:p15="http://schemas.microsoft.com/office/powerpoint/2012/main" xmlns="">
         <p15:guide id="1" orient="horz" pos="3748">
           <p15:clr>
             <a:srgbClr val="A4A3A4"/>
@@ -214,7 +214,7 @@
       </p15:sldGuideLst>
     </p:ext>
     <p:ext uri="{2D200454-40CA-4A62-9FC3-DE9A4176ACB9}">
-      <p15:notesGuideLst xmlns:p15="http://schemas.microsoft.com/office/powerpoint/2012/main">
+      <p15:notesGuideLst xmlns:p15="http://schemas.microsoft.com/office/powerpoint/2012/main" xmlns="">
         <p15:guide id="1" orient="horz" pos="3127">
           <p15:clr>
             <a:srgbClr val="A4A3A4"/>
@@ -4798,70 +4798,13 @@
       </p:grpSp>
       <p:sp>
         <p:nvSpPr>
-          <p:cNvPr id="5" name="TextBox 4"/>
-          <p:cNvSpPr txBox="1"/>
-          <p:nvPr/>
-        </p:nvSpPr>
-        <p:spPr>
-          <a:xfrm>
-            <a:off x="601608" y="1316087"/>
-            <a:ext cx="1604603" cy="769441"/>
-          </a:xfrm>
-          <a:prstGeom prst="rect">
-            <a:avLst/>
-          </a:prstGeom>
-          <a:solidFill>
-            <a:schemeClr val="tx1"/>
-          </a:solidFill>
-          <a:ln>
-            <a:noFill/>
-          </a:ln>
-        </p:spPr>
-        <p:txBody>
-          <a:bodyPr wrap="square" rtlCol="0">
-            <a:spAutoFit/>
-          </a:bodyPr>
-          <a:lstStyle/>
-          <a:p>
-            <a:r>
-              <a:rPr lang="en-US" sz="4400" dirty="0" smtClean="0">
-                <a:ln w="22225">
-                  <a:solidFill>
-                    <a:schemeClr val="accent2"/>
-                  </a:solidFill>
-                  <a:prstDash val="solid"/>
-                </a:ln>
-                <a:solidFill>
-                  <a:schemeClr val="bg1"/>
-                </a:solidFill>
-                <a:latin typeface="Arial Rounded MT Bold" panose="020F0704030504030204" pitchFamily="34" charset="0"/>
-              </a:rPr>
-              <a:t>knits</a:t>
-            </a:r>
-            <a:endParaRPr lang="en-US" sz="4400" dirty="0">
-              <a:ln w="22225">
-                <a:solidFill>
-                  <a:schemeClr val="accent2"/>
-                </a:solidFill>
-                <a:prstDash val="solid"/>
-              </a:ln>
-              <a:solidFill>
-                <a:schemeClr val="bg1"/>
-              </a:solidFill>
-              <a:latin typeface="Arial Rounded MT Bold" panose="020F0704030504030204" pitchFamily="34" charset="0"/>
-            </a:endParaRPr>
-          </a:p>
-        </p:txBody>
-      </p:sp>
-      <p:sp>
-        <p:nvSpPr>
           <p:cNvPr id="11" name="TextBox 10"/>
           <p:cNvSpPr txBox="1"/>
           <p:nvPr/>
         </p:nvSpPr>
         <p:spPr>
           <a:xfrm>
-            <a:off x="467544" y="5394873"/>
+            <a:off x="1920533" y="980287"/>
             <a:ext cx="1576968" cy="584775"/>
           </a:xfrm>
           <a:prstGeom prst="rect">
@@ -4919,7 +4862,7 @@
         </p:nvSpPr>
         <p:spPr>
           <a:xfrm>
-            <a:off x="812206" y="3717032"/>
+            <a:off x="467544" y="1988840"/>
             <a:ext cx="1576968" cy="584775"/>
           </a:xfrm>
           <a:prstGeom prst="rect">
@@ -4971,6 +4914,30 @@
       </p:sp>
       <p:pic>
         <p:nvPicPr>
+          <p:cNvPr id="2" name="Picture 1"/>
+          <p:cNvPicPr>
+            <a:picLocks noChangeAspect="1"/>
+          </p:cNvPicPr>
+          <p:nvPr/>
+        </p:nvPicPr>
+        <p:blipFill>
+          <a:blip r:embed="rId4"/>
+          <a:stretch>
+            <a:fillRect/>
+          </a:stretch>
+        </p:blipFill>
+        <p:spPr>
+          <a:xfrm rot="5400000">
+            <a:off x="6500708" y="1932340"/>
+            <a:ext cx="1709811" cy="958715"/>
+          </a:xfrm>
+          <a:prstGeom prst="rect">
+            <a:avLst/>
+          </a:prstGeom>
+        </p:spPr>
+      </p:pic>
+      <p:pic>
+        <p:nvPicPr>
           <p:cNvPr id="4" name="Picture 3"/>
           <p:cNvPicPr>
             <a:picLocks noChangeAspect="1"/>
@@ -4978,7 +4945,7 @@
           <p:nvPr/>
         </p:nvPicPr>
         <p:blipFill>
-          <a:blip r:embed="rId4"/>
+          <a:blip r:embed="rId5"/>
           <a:stretch>
             <a:fillRect/>
           </a:stretch>
@@ -4993,30 +4960,63 @@
           </a:prstGeom>
         </p:spPr>
       </p:pic>
-      <p:pic>
-        <p:nvPicPr>
-          <p:cNvPr id="2" name="Picture 1"/>
-          <p:cNvPicPr>
-            <a:picLocks noChangeAspect="1"/>
-          </p:cNvPicPr>
+      <p:sp>
+        <p:nvSpPr>
+          <p:cNvPr id="5" name="TextBox 4"/>
+          <p:cNvSpPr txBox="1"/>
           <p:nvPr/>
-        </p:nvPicPr>
-        <p:blipFill>
-          <a:blip r:embed="rId5"/>
-          <a:stretch>
-            <a:fillRect/>
-          </a:stretch>
-        </p:blipFill>
+        </p:nvSpPr>
         <p:spPr>
-          <a:xfrm rot="5400000">
-            <a:off x="6500708" y="1932340"/>
-            <a:ext cx="1709811" cy="958715"/>
+          <a:xfrm>
+            <a:off x="786996" y="1103397"/>
+            <a:ext cx="938064" cy="461665"/>
           </a:xfrm>
           <a:prstGeom prst="rect">
             <a:avLst/>
           </a:prstGeom>
+          <a:solidFill>
+            <a:schemeClr val="tx1"/>
+          </a:solidFill>
+          <a:ln>
+            <a:noFill/>
+          </a:ln>
         </p:spPr>
-      </p:pic>
+        <p:txBody>
+          <a:bodyPr wrap="square" rtlCol="0">
+            <a:spAutoFit/>
+          </a:bodyPr>
+          <a:lstStyle/>
+          <a:p>
+            <a:r>
+              <a:rPr lang="en-US" sz="2400" dirty="0" smtClean="0">
+                <a:ln w="22225">
+                  <a:solidFill>
+                    <a:schemeClr val="accent2"/>
+                  </a:solidFill>
+                  <a:prstDash val="solid"/>
+                </a:ln>
+                <a:solidFill>
+                  <a:schemeClr val="bg1"/>
+                </a:solidFill>
+                <a:latin typeface="Arial Rounded MT Bold" panose="020F0704030504030204" pitchFamily="34" charset="0"/>
+              </a:rPr>
+              <a:t>knits</a:t>
+            </a:r>
+            <a:endParaRPr lang="en-US" sz="2400" dirty="0">
+              <a:ln w="22225">
+                <a:solidFill>
+                  <a:schemeClr val="accent2"/>
+                </a:solidFill>
+                <a:prstDash val="solid"/>
+              </a:ln>
+              <a:solidFill>
+                <a:schemeClr val="bg1"/>
+              </a:solidFill>
+              <a:latin typeface="Arial Rounded MT Bold" panose="020F0704030504030204" pitchFamily="34" charset="0"/>
+            </a:endParaRPr>
+          </a:p>
+        </p:txBody>
+      </p:sp>
     </p:spTree>
     <p:extLst>
       <p:ext uri="{BB962C8B-B14F-4D97-AF65-F5344CB8AC3E}">

</xml_diff>

<commit_message>
updates in projects and logo
</commit_message>
<xml_diff>
--- a/Presentations/KNITS/KNITS-Logo.pptx
+++ b/Presentations/KNITS/KNITS-Logo.pptx
@@ -145,7 +145,7 @@
   </p:defaultTextStyle>
   <p:extLst>
     <p:ext uri="{EFAFB233-063F-42B5-8137-9DF3F51BA10A}">
-      <p15:sldGuideLst xmlns:p15="http://schemas.microsoft.com/office/powerpoint/2012/main" xmlns="">
+      <p15:sldGuideLst xmlns:p15="http://schemas.microsoft.com/office/powerpoint/2012/main">
         <p15:guide id="1" orient="horz" pos="3748">
           <p15:clr>
             <a:srgbClr val="A4A3A4"/>
@@ -214,7 +214,7 @@
       </p15:sldGuideLst>
     </p:ext>
     <p:ext uri="{2D200454-40CA-4A62-9FC3-DE9A4176ACB9}">
-      <p15:notesGuideLst xmlns:p15="http://schemas.microsoft.com/office/powerpoint/2012/main" xmlns="">
+      <p15:notesGuideLst xmlns:p15="http://schemas.microsoft.com/office/powerpoint/2012/main">
         <p15:guide id="1" orient="horz" pos="3127">
           <p15:clr>
             <a:srgbClr val="A4A3A4"/>
@@ -4862,7 +4862,7 @@
         </p:nvSpPr>
         <p:spPr>
           <a:xfrm>
-            <a:off x="467544" y="1988840"/>
+            <a:off x="550110" y="1711219"/>
             <a:ext cx="1576968" cy="584775"/>
           </a:xfrm>
           <a:prstGeom prst="rect">
@@ -5013,6 +5013,144 @@
                 <a:schemeClr val="bg1"/>
               </a:solidFill>
               <a:latin typeface="Arial Rounded MT Bold" panose="020F0704030504030204" pitchFamily="34" charset="0"/>
+            </a:endParaRPr>
+          </a:p>
+        </p:txBody>
+      </p:sp>
+      <p:pic>
+        <p:nvPicPr>
+          <p:cNvPr id="8" name="Picture 7"/>
+          <p:cNvPicPr>
+            <a:picLocks noChangeAspect="1"/>
+          </p:cNvPicPr>
+          <p:nvPr/>
+        </p:nvPicPr>
+        <p:blipFill>
+          <a:blip r:embed="rId6"/>
+          <a:stretch>
+            <a:fillRect/>
+          </a:stretch>
+        </p:blipFill>
+        <p:spPr>
+          <a:xfrm>
+            <a:off x="1725060" y="4487700"/>
+            <a:ext cx="1444605" cy="1413148"/>
+          </a:xfrm>
+          <a:prstGeom prst="rect">
+            <a:avLst/>
+          </a:prstGeom>
+        </p:spPr>
+      </p:pic>
+      <p:sp>
+        <p:nvSpPr>
+          <p:cNvPr id="9" name="TextBox 8"/>
+          <p:cNvSpPr txBox="1"/>
+          <p:nvPr/>
+        </p:nvSpPr>
+        <p:spPr>
+          <a:xfrm>
+            <a:off x="3059832" y="5009376"/>
+            <a:ext cx="5362776" cy="369332"/>
+          </a:xfrm>
+          <a:prstGeom prst="rect">
+            <a:avLst/>
+          </a:prstGeom>
+          <a:noFill/>
+        </p:spPr>
+        <p:txBody>
+          <a:bodyPr wrap="square" rtlCol="0">
+            <a:spAutoFit/>
+          </a:bodyPr>
+          <a:lstStyle/>
+          <a:p>
+            <a:r>
+              <a:rPr lang="en-US" sz="1800" dirty="0" smtClean="0">
+                <a:solidFill>
+                  <a:schemeClr val="tx2"/>
+                </a:solidFill>
+              </a:rPr>
+              <a:t>Kuehne+Nagel Information Technology School </a:t>
+            </a:r>
+            <a:endParaRPr lang="en-US" sz="1800" dirty="0">
+              <a:solidFill>
+                <a:schemeClr val="tx2"/>
+              </a:solidFill>
+            </a:endParaRPr>
+          </a:p>
+        </p:txBody>
+      </p:sp>
+      <p:sp>
+        <p:nvSpPr>
+          <p:cNvPr id="15" name="TextBox 14"/>
+          <p:cNvSpPr txBox="1"/>
+          <p:nvPr/>
+        </p:nvSpPr>
+        <p:spPr>
+          <a:xfrm>
+            <a:off x="6702847" y="3510994"/>
+            <a:ext cx="1228564" cy="492443"/>
+          </a:xfrm>
+          <a:prstGeom prst="rect">
+            <a:avLst/>
+          </a:prstGeom>
+          <a:noFill/>
+        </p:spPr>
+        <p:txBody>
+          <a:bodyPr wrap="square" rtlCol="0">
+            <a:spAutoFit/>
+          </a:bodyPr>
+          <a:lstStyle/>
+          <a:p>
+            <a:r>
+              <a:rPr lang="en-US" dirty="0" smtClean="0">
+                <a:solidFill>
+                  <a:schemeClr val="tx2"/>
+                </a:solidFill>
+              </a:rPr>
+              <a:t>Tallinn</a:t>
+            </a:r>
+            <a:endParaRPr lang="en-US" dirty="0">
+              <a:solidFill>
+                <a:schemeClr val="tx2"/>
+              </a:solidFill>
+            </a:endParaRPr>
+          </a:p>
+        </p:txBody>
+      </p:sp>
+      <p:sp>
+        <p:nvSpPr>
+          <p:cNvPr id="16" name="TextBox 15"/>
+          <p:cNvSpPr txBox="1"/>
+          <p:nvPr/>
+        </p:nvSpPr>
+        <p:spPr>
+          <a:xfrm>
+            <a:off x="1411865" y="2968696"/>
+            <a:ext cx="886704" cy="369332"/>
+          </a:xfrm>
+          <a:prstGeom prst="rect">
+            <a:avLst/>
+          </a:prstGeom>
+          <a:noFill/>
+        </p:spPr>
+        <p:txBody>
+          <a:bodyPr wrap="square" rtlCol="0">
+            <a:spAutoFit/>
+          </a:bodyPr>
+          <a:lstStyle/>
+          <a:p>
+            <a:r>
+              <a:rPr lang="en-US" sz="1800" dirty="0" smtClean="0">
+                <a:solidFill>
+                  <a:schemeClr val="tx2"/>
+                </a:solidFill>
+              </a:rPr>
+              <a:t>KNITS</a:t>
+            </a:r>
+            <a:endParaRPr lang="en-US" sz="1800" dirty="0">
+              <a:solidFill>
+                <a:schemeClr val="tx2"/>
+              </a:solidFill>
             </a:endParaRPr>
           </a:p>
         </p:txBody>

</xml_diff>